<commit_message>
updated doc and improved pdf plot
</commit_message>
<xml_diff>
--- a/doc/_pictures/tridimap_pics.pptx
+++ b/doc/_pictures/tridimap_pics.pptx
@@ -3706,7 +3706,7 @@
       </p:grpSpPr>
       <p:pic>
         <p:nvPicPr>
-          <p:cNvPr id="16387" name="Picture 3"/>
+          <p:cNvPr id="1026" name="Picture 2"/>
           <p:cNvPicPr>
             <a:picLocks noChangeAspect="1" noChangeArrowheads="1"/>
           </p:cNvPicPr>
@@ -3727,7 +3727,7 @@
         </p:blipFill>
         <p:spPr bwMode="auto">
           <a:xfrm>
-            <a:off x="-971550" y="355600"/>
+            <a:off x="-30938" y="355600"/>
             <a:ext cx="11087100" cy="6146800"/>
           </a:xfrm>
           <a:prstGeom prst="rect">

</xml_diff>

<commit_message>
updated doc and deconvolution step (colorized barchart)
</commit_message>
<xml_diff>
--- a/doc/_pictures/tridimap_pics.pptx
+++ b/doc/_pictures/tridimap_pics.pptx
@@ -20,7 +20,7 @@
     <p:sldId id="263" r:id="rId14"/>
     <p:sldId id="264" r:id="rId15"/>
     <p:sldId id="270" r:id="rId16"/>
-    <p:sldId id="271" r:id="rId17"/>
+    <p:sldId id="278" r:id="rId17"/>
     <p:sldId id="272" r:id="rId18"/>
     <p:sldId id="273" r:id="rId19"/>
     <p:sldId id="274" r:id="rId20"/>
@@ -309,7 +309,7 @@
           <a:p>
             <a:fld id="{085B54D5-7D44-40F3-B5B5-89B7D7B94E09}" type="datetimeFigureOut">
               <a:rPr lang="fr-FR" smtClean="0"/>
-              <a:t>10/05/2018</a:t>
+              <a:t>15/05/2018</a:t>
             </a:fld>
             <a:endParaRPr lang="fr-FR"/>
           </a:p>
@@ -479,7 +479,7 @@
           <a:p>
             <a:fld id="{085B54D5-7D44-40F3-B5B5-89B7D7B94E09}" type="datetimeFigureOut">
               <a:rPr lang="fr-FR" smtClean="0"/>
-              <a:t>10/05/2018</a:t>
+              <a:t>15/05/2018</a:t>
             </a:fld>
             <a:endParaRPr lang="fr-FR"/>
           </a:p>
@@ -659,7 +659,7 @@
           <a:p>
             <a:fld id="{085B54D5-7D44-40F3-B5B5-89B7D7B94E09}" type="datetimeFigureOut">
               <a:rPr lang="fr-FR" smtClean="0"/>
-              <a:t>10/05/2018</a:t>
+              <a:t>15/05/2018</a:t>
             </a:fld>
             <a:endParaRPr lang="fr-FR"/>
           </a:p>
@@ -829,7 +829,7 @@
           <a:p>
             <a:fld id="{085B54D5-7D44-40F3-B5B5-89B7D7B94E09}" type="datetimeFigureOut">
               <a:rPr lang="fr-FR" smtClean="0"/>
-              <a:t>10/05/2018</a:t>
+              <a:t>15/05/2018</a:t>
             </a:fld>
             <a:endParaRPr lang="fr-FR"/>
           </a:p>
@@ -1075,7 +1075,7 @@
           <a:p>
             <a:fld id="{085B54D5-7D44-40F3-B5B5-89B7D7B94E09}" type="datetimeFigureOut">
               <a:rPr lang="fr-FR" smtClean="0"/>
-              <a:t>10/05/2018</a:t>
+              <a:t>15/05/2018</a:t>
             </a:fld>
             <a:endParaRPr lang="fr-FR"/>
           </a:p>
@@ -1363,7 +1363,7 @@
           <a:p>
             <a:fld id="{085B54D5-7D44-40F3-B5B5-89B7D7B94E09}" type="datetimeFigureOut">
               <a:rPr lang="fr-FR" smtClean="0"/>
-              <a:t>10/05/2018</a:t>
+              <a:t>15/05/2018</a:t>
             </a:fld>
             <a:endParaRPr lang="fr-FR"/>
           </a:p>
@@ -1785,7 +1785,7 @@
           <a:p>
             <a:fld id="{085B54D5-7D44-40F3-B5B5-89B7D7B94E09}" type="datetimeFigureOut">
               <a:rPr lang="fr-FR" smtClean="0"/>
-              <a:t>10/05/2018</a:t>
+              <a:t>15/05/2018</a:t>
             </a:fld>
             <a:endParaRPr lang="fr-FR"/>
           </a:p>
@@ -1903,7 +1903,7 @@
           <a:p>
             <a:fld id="{085B54D5-7D44-40F3-B5B5-89B7D7B94E09}" type="datetimeFigureOut">
               <a:rPr lang="fr-FR" smtClean="0"/>
-              <a:t>10/05/2018</a:t>
+              <a:t>15/05/2018</a:t>
             </a:fld>
             <a:endParaRPr lang="fr-FR"/>
           </a:p>
@@ -1998,7 +1998,7 @@
           <a:p>
             <a:fld id="{085B54D5-7D44-40F3-B5B5-89B7D7B94E09}" type="datetimeFigureOut">
               <a:rPr lang="fr-FR" smtClean="0"/>
-              <a:t>10/05/2018</a:t>
+              <a:t>15/05/2018</a:t>
             </a:fld>
             <a:endParaRPr lang="fr-FR"/>
           </a:p>
@@ -2275,7 +2275,7 @@
           <a:p>
             <a:fld id="{085B54D5-7D44-40F3-B5B5-89B7D7B94E09}" type="datetimeFigureOut">
               <a:rPr lang="fr-FR" smtClean="0"/>
-              <a:t>10/05/2018</a:t>
+              <a:t>15/05/2018</a:t>
             </a:fld>
             <a:endParaRPr lang="fr-FR"/>
           </a:p>
@@ -2528,7 +2528,7 @@
           <a:p>
             <a:fld id="{085B54D5-7D44-40F3-B5B5-89B7D7B94E09}" type="datetimeFigureOut">
               <a:rPr lang="fr-FR" smtClean="0"/>
-              <a:t>10/05/2018</a:t>
+              <a:t>15/05/2018</a:t>
             </a:fld>
             <a:endParaRPr lang="fr-FR"/>
           </a:p>
@@ -2741,7 +2741,7 @@
           <a:p>
             <a:fld id="{085B54D5-7D44-40F3-B5B5-89B7D7B94E09}" type="datetimeFigureOut">
               <a:rPr lang="fr-FR" smtClean="0"/>
-              <a:t>10/05/2018</a:t>
+              <a:t>15/05/2018</a:t>
             </a:fld>
             <a:endParaRPr lang="fr-FR"/>
           </a:p>
@@ -3727,7 +3727,7 @@
         </p:blipFill>
         <p:spPr bwMode="auto">
           <a:xfrm>
-            <a:off x="-30938" y="355600"/>
+            <a:off x="0" y="355600"/>
             <a:ext cx="11087100" cy="6146800"/>
           </a:xfrm>
           <a:prstGeom prst="rect">
@@ -3761,7 +3761,7 @@
     </p:spTree>
     <p:extLst>
       <p:ext uri="{BB962C8B-B14F-4D97-AF65-F5344CB8AC3E}">
-        <p14:creationId xmlns:p14="http://schemas.microsoft.com/office/powerpoint/2010/main" val="4032177907"/>
+        <p14:creationId xmlns:p14="http://schemas.microsoft.com/office/powerpoint/2010/main" val="3771378303"/>
       </p:ext>
     </p:extLst>
   </p:cSld>

</xml_diff>